<commit_message>
updated instruction slide #53
</commit_message>
<xml_diff>
--- a/public/js/tasks/cooperation_task/media/Cooperation_Task_Instructions.10.10.2022.pptx
+++ b/public/js/tasks/cooperation_task/media/Cooperation_Task_Instructions.10.10.2022.pptx
@@ -257,7 +257,7 @@
           <a:p>
             <a:fld id="{5ACDFB13-8C7E-2148-B293-047F9641DD71}" type="datetimeFigureOut">
               <a:rPr lang="en-US" smtClean="0"/>
-              <a:t>10/4/22</a:t>
+              <a:t>10/10/22</a:t>
             </a:fld>
             <a:endParaRPr lang="en-US" dirty="0"/>
           </a:p>
@@ -2089,7 +2089,7 @@
           <a:p>
             <a:fld id="{E69A4D3A-6EF8-7448-AC6F-AD52FEDAA6A8}" type="datetimeFigureOut">
               <a:rPr lang="en-US" smtClean="0"/>
-              <a:t>10/4/22</a:t>
+              <a:t>10/10/22</a:t>
             </a:fld>
             <a:endParaRPr lang="en-US" dirty="0"/>
           </a:p>
@@ -2257,7 +2257,7 @@
           <a:p>
             <a:fld id="{E69A4D3A-6EF8-7448-AC6F-AD52FEDAA6A8}" type="datetimeFigureOut">
               <a:rPr lang="en-US" smtClean="0"/>
-              <a:t>10/4/22</a:t>
+              <a:t>10/10/22</a:t>
             </a:fld>
             <a:endParaRPr lang="en-US" dirty="0"/>
           </a:p>
@@ -2435,7 +2435,7 @@
           <a:p>
             <a:fld id="{E69A4D3A-6EF8-7448-AC6F-AD52FEDAA6A8}" type="datetimeFigureOut">
               <a:rPr lang="en-US" smtClean="0"/>
-              <a:t>10/4/22</a:t>
+              <a:t>10/10/22</a:t>
             </a:fld>
             <a:endParaRPr lang="en-US" dirty="0"/>
           </a:p>
@@ -2603,7 +2603,7 @@
           <a:p>
             <a:fld id="{E69A4D3A-6EF8-7448-AC6F-AD52FEDAA6A8}" type="datetimeFigureOut">
               <a:rPr lang="en-US" smtClean="0"/>
-              <a:t>10/4/22</a:t>
+              <a:t>10/10/22</a:t>
             </a:fld>
             <a:endParaRPr lang="en-US" dirty="0"/>
           </a:p>
@@ -2848,7 +2848,7 @@
           <a:p>
             <a:fld id="{E69A4D3A-6EF8-7448-AC6F-AD52FEDAA6A8}" type="datetimeFigureOut">
               <a:rPr lang="en-US" smtClean="0"/>
-              <a:t>10/4/22</a:t>
+              <a:t>10/10/22</a:t>
             </a:fld>
             <a:endParaRPr lang="en-US" dirty="0"/>
           </a:p>
@@ -3133,7 +3133,7 @@
           <a:p>
             <a:fld id="{E69A4D3A-6EF8-7448-AC6F-AD52FEDAA6A8}" type="datetimeFigureOut">
               <a:rPr lang="en-US" smtClean="0"/>
-              <a:t>10/4/22</a:t>
+              <a:t>10/10/22</a:t>
             </a:fld>
             <a:endParaRPr lang="en-US" dirty="0"/>
           </a:p>
@@ -3552,7 +3552,7 @@
           <a:p>
             <a:fld id="{E69A4D3A-6EF8-7448-AC6F-AD52FEDAA6A8}" type="datetimeFigureOut">
               <a:rPr lang="en-US" smtClean="0"/>
-              <a:t>10/4/22</a:t>
+              <a:t>10/10/22</a:t>
             </a:fld>
             <a:endParaRPr lang="en-US" dirty="0"/>
           </a:p>
@@ -3669,7 +3669,7 @@
           <a:p>
             <a:fld id="{E69A4D3A-6EF8-7448-AC6F-AD52FEDAA6A8}" type="datetimeFigureOut">
               <a:rPr lang="en-US" smtClean="0"/>
-              <a:t>10/4/22</a:t>
+              <a:t>10/10/22</a:t>
             </a:fld>
             <a:endParaRPr lang="en-US" dirty="0"/>
           </a:p>
@@ -3764,7 +3764,7 @@
           <a:p>
             <a:fld id="{E69A4D3A-6EF8-7448-AC6F-AD52FEDAA6A8}" type="datetimeFigureOut">
               <a:rPr lang="en-US" smtClean="0"/>
-              <a:t>10/4/22</a:t>
+              <a:t>10/10/22</a:t>
             </a:fld>
             <a:endParaRPr lang="en-US" dirty="0"/>
           </a:p>
@@ -4039,7 +4039,7 @@
           <a:p>
             <a:fld id="{E69A4D3A-6EF8-7448-AC6F-AD52FEDAA6A8}" type="datetimeFigureOut">
               <a:rPr lang="en-US" smtClean="0"/>
-              <a:t>10/4/22</a:t>
+              <a:t>10/10/22</a:t>
             </a:fld>
             <a:endParaRPr lang="en-US" dirty="0"/>
           </a:p>
@@ -4294,7 +4294,7 @@
           <a:p>
             <a:fld id="{E69A4D3A-6EF8-7448-AC6F-AD52FEDAA6A8}" type="datetimeFigureOut">
               <a:rPr lang="en-US" smtClean="0"/>
-              <a:t>10/4/22</a:t>
+              <a:t>10/10/22</a:t>
             </a:fld>
             <a:endParaRPr lang="en-US" dirty="0"/>
           </a:p>
@@ -4508,7 +4508,7 @@
           <a:p>
             <a:fld id="{E69A4D3A-6EF8-7448-AC6F-AD52FEDAA6A8}" type="datetimeFigureOut">
               <a:rPr lang="en-US" smtClean="0"/>
-              <a:t>10/4/22</a:t>
+              <a:t>10/10/22</a:t>
             </a:fld>
             <a:endParaRPr lang="en-US" dirty="0"/>
           </a:p>
@@ -6028,8 +6028,8 @@
         </p:blipFill>
         <p:spPr>
           <a:xfrm>
-            <a:off x="8418939" y="2403645"/>
-            <a:ext cx="2975642" cy="2231731"/>
+            <a:off x="8418938" y="2403645"/>
+            <a:ext cx="2975643" cy="2231732"/>
           </a:xfrm>
           <a:prstGeom prst="rect">
             <a:avLst/>
@@ -6058,7 +6058,37 @@
         </p:blipFill>
         <p:spPr>
           <a:xfrm>
-            <a:off x="1116494" y="2403645"/>
+            <a:off x="797422" y="2403644"/>
+            <a:ext cx="2975641" cy="2231731"/>
+          </a:xfrm>
+          <a:prstGeom prst="rect">
+            <a:avLst/>
+          </a:prstGeom>
+        </p:spPr>
+      </p:pic>
+      <p:pic>
+        <p:nvPicPr>
+          <p:cNvPr id="4" name="Picture 3" descr="Background pattern&#10;&#10;Description automatically generated">
+            <a:extLst>
+              <a:ext uri="{FF2B5EF4-FFF2-40B4-BE49-F238E27FC236}">
+                <a16:creationId xmlns:a16="http://schemas.microsoft.com/office/drawing/2014/main" id="{37043451-CE54-CF44-9836-512A14791043}"/>
+              </a:ext>
+            </a:extLst>
+          </p:cNvPr>
+          <p:cNvPicPr>
+            <a:picLocks noChangeAspect="1"/>
+          </p:cNvPicPr>
+          <p:nvPr/>
+        </p:nvPicPr>
+        <p:blipFill>
+          <a:blip r:embed="rId4"/>
+          <a:stretch>
+            <a:fillRect/>
+          </a:stretch>
+        </p:blipFill>
+        <p:spPr>
+          <a:xfrm>
+            <a:off x="4608179" y="2403643"/>
             <a:ext cx="2975641" cy="2231731"/>
           </a:xfrm>
           <a:prstGeom prst="rect">
@@ -7756,6 +7786,36 @@
           <a:chExt cx="0" cy="0"/>
         </a:xfrm>
       </p:grpSpPr>
+      <p:pic>
+        <p:nvPicPr>
+          <p:cNvPr id="3" name="Picture 2">
+            <a:extLst>
+              <a:ext uri="{FF2B5EF4-FFF2-40B4-BE49-F238E27FC236}">
+                <a16:creationId xmlns:a16="http://schemas.microsoft.com/office/drawing/2014/main" id="{BF8746C0-68A6-B149-BFDE-547A7D0A9EE6}"/>
+              </a:ext>
+            </a:extLst>
+          </p:cNvPr>
+          <p:cNvPicPr>
+            <a:picLocks noChangeAspect="1"/>
+          </p:cNvPicPr>
+          <p:nvPr/>
+        </p:nvPicPr>
+        <p:blipFill>
+          <a:blip r:embed="rId3"/>
+          <a:stretch>
+            <a:fillRect/>
+          </a:stretch>
+        </p:blipFill>
+        <p:spPr>
+          <a:xfrm>
+            <a:off x="5613400" y="3399905"/>
+            <a:ext cx="965200" cy="965200"/>
+          </a:xfrm>
+          <a:prstGeom prst="rect">
+            <a:avLst/>
+          </a:prstGeom>
+        </p:spPr>
+      </p:pic>
       <p:sp>
         <p:nvSpPr>
           <p:cNvPr id="26" name="Title 3"/>
@@ -9198,7 +9258,7 @@
             </a:pPr>
             <a:r>
               <a:rPr lang="en-US" sz="2400" dirty="0"/>
-              <a:t>For instance, in the example game below, person #2 had so far shown you two pleasant images/sounds and one unpleasant image/sound. </a:t>
+              <a:t>For instance, in the example game below, person #2 had so far shown you two pleasant images/sounds and one meaningless image/sound. </a:t>
             </a:r>
           </a:p>
         </p:txBody>
@@ -9295,10 +9355,10 @@
       </p:pic>
       <p:pic>
         <p:nvPicPr>
-          <p:cNvPr id="14" name="Picture 13">
+          <p:cNvPr id="16" name="Picture 15">
             <a:extLst>
               <a:ext uri="{FF2B5EF4-FFF2-40B4-BE49-F238E27FC236}">
-                <a16:creationId xmlns:a16="http://schemas.microsoft.com/office/drawing/2014/main" id="{AAF44D43-DC1D-3547-AA54-92D11DF19169}"/>
+                <a16:creationId xmlns:a16="http://schemas.microsoft.com/office/drawing/2014/main" id="{3EA73852-4A05-F540-A9A2-FAD33C89A2A7}"/>
               </a:ext>
             </a:extLst>
           </p:cNvPr>
@@ -9315,7 +9375,7 @@
         </p:blipFill>
         <p:spPr>
           <a:xfrm>
-            <a:off x="5708823" y="4656365"/>
+            <a:off x="5717533" y="4656365"/>
             <a:ext cx="238898" cy="238898"/>
           </a:xfrm>
           <a:prstGeom prst="rect">

</xml_diff>